<commit_message>
Modified 'choice of anonymity' state diagram to include guards
</commit_message>
<xml_diff>
--- a/docs/sprint3/archives/choice-of-anonymity-state-diagram.pptx
+++ b/docs/sprint3/archives/choice-of-anonymity-state-diagram.pptx
@@ -106,7 +106,7 @@
   </p:defaultTextStyle>
   <p:extLst>
     <p:ext uri="{EFAFB233-063F-42B5-8137-9DF3F51BA10A}">
-      <p15:sldGuideLst xmlns:p15="http://schemas.microsoft.com/office/powerpoint/2012/main"/>
+      <p15:sldGuideLst xmlns:p15="http://schemas.microsoft.com/office/powerpoint/2012/main" xmlns=""/>
     </p:ext>
   </p:extLst>
 </p:presentation>
@@ -3146,7 +3146,7 @@
         <p:spPr>
           <a:xfrm>
             <a:off x="4244931" y="1277620"/>
-            <a:ext cx="2151551" cy="923330"/>
+            <a:ext cx="2000163" cy="646331"/>
           </a:xfrm>
           <a:prstGeom prst="rect">
             <a:avLst/>
@@ -3160,21 +3160,17 @@
           <a:lstStyle/>
           <a:p>
             <a:r>
-              <a:rPr lang="en-US" dirty="0"/>
-              <a:t>   Click drip button,</a:t>
-            </a:r>
-          </a:p>
-          <a:p>
-            <a:r>
-              <a:rPr lang="en-US" dirty="0"/>
-              <a:t>Choose the choice of</a:t>
-            </a:r>
-          </a:p>
-          <a:p>
-            <a:r>
-              <a:rPr lang="en-US" dirty="0"/>
-              <a:t>      anonymity</a:t>
-            </a:r>
+              <a:rPr lang="en-US" smtClean="0"/>
+              <a:t>Click “Drip” button </a:t>
+            </a:r>
+            <a:br>
+              <a:rPr lang="en-US" smtClean="0"/>
+            </a:br>
+            <a:r>
+              <a:rPr lang="en-US" smtClean="0"/>
+              <a:t>[drip data is valid]</a:t>
+            </a:r>
+            <a:endParaRPr lang="en-US" dirty="0"/>
           </a:p>
         </p:txBody>
       </p:sp>
@@ -3187,7 +3183,7 @@
         <p:spPr>
           <a:xfrm>
             <a:off x="2319250" y="3997610"/>
-            <a:ext cx="2685222" cy="646331"/>
+            <a:ext cx="2028761" cy="646331"/>
           </a:xfrm>
           <a:prstGeom prst="rect">
             <a:avLst/>
@@ -3201,15 +3197,17 @@
           <a:lstStyle/>
           <a:p>
             <a:r>
-              <a:rPr lang="en-US" dirty="0"/>
-              <a:t>Prompting to create new</a:t>
-            </a:r>
-          </a:p>
-          <a:p>
-            <a:r>
-              <a:rPr lang="en-US" dirty="0"/>
-              <a:t> Drip, if any error(s) persist</a:t>
-            </a:r>
+              <a:rPr lang="en-US" smtClean="0"/>
+              <a:t>Click “Drip” button </a:t>
+            </a:r>
+            <a:br>
+              <a:rPr lang="en-US" smtClean="0"/>
+            </a:br>
+            <a:r>
+              <a:rPr lang="en-US" smtClean="0"/>
+              <a:t>[drip data is invalid]</a:t>
+            </a:r>
+            <a:endParaRPr lang="en-US" dirty="0"/>
           </a:p>
         </p:txBody>
       </p:sp>
@@ -3661,7 +3659,7 @@
   <a:extraClrSchemeLst/>
   <a:extLst>
     <a:ext uri="{05A4C25C-085E-4340-85A3-A5531E510DB2}">
-      <thm15:themeFamily xmlns:thm15="http://schemas.microsoft.com/office/thememl/2012/main" name="Office Theme" id="{62F939B6-93AF-4DB8-9C6B-D6C7DFDC589F}" vid="{4A3C46E8-61CC-4603-A589-7422A47A8E4A}"/>
+      <thm15:themeFamily xmlns:thm15="http://schemas.microsoft.com/office/thememl/2012/main" xmlns="" name="Office Theme" id="{62F939B6-93AF-4DB8-9C6B-D6C7DFDC589F}" vid="{4A3C46E8-61CC-4603-A589-7422A47A8E4A}"/>
     </a:ext>
   </a:extLst>
 </a:theme>

</xml_diff>